<commit_message>
Save changes on figure change.
</commit_message>
<xml_diff>
--- a/docs/source/figures/flow.pptx
+++ b/docs/source/figures/flow.pptx
@@ -243,7 +243,7 @@
           <a:p>
             <a:fld id="{2BCCED57-25DD-474A-969A-916086AE8F09}" type="datetimeFigureOut">
               <a:rPr lang="en-US" smtClean="0"/>
-              <a:t>3/25/2019</a:t>
+              <a:t>12/16/2019</a:t>
             </a:fld>
             <a:endParaRPr lang="en-US"/>
           </a:p>
@@ -413,7 +413,7 @@
           <a:p>
             <a:fld id="{2BCCED57-25DD-474A-969A-916086AE8F09}" type="datetimeFigureOut">
               <a:rPr lang="en-US" smtClean="0"/>
-              <a:t>3/25/2019</a:t>
+              <a:t>12/16/2019</a:t>
             </a:fld>
             <a:endParaRPr lang="en-US"/>
           </a:p>
@@ -593,7 +593,7 @@
           <a:p>
             <a:fld id="{2BCCED57-25DD-474A-969A-916086AE8F09}" type="datetimeFigureOut">
               <a:rPr lang="en-US" smtClean="0"/>
-              <a:t>3/25/2019</a:t>
+              <a:t>12/16/2019</a:t>
             </a:fld>
             <a:endParaRPr lang="en-US"/>
           </a:p>
@@ -763,7 +763,7 @@
           <a:p>
             <a:fld id="{2BCCED57-25DD-474A-969A-916086AE8F09}" type="datetimeFigureOut">
               <a:rPr lang="en-US" smtClean="0"/>
-              <a:t>3/25/2019</a:t>
+              <a:t>12/16/2019</a:t>
             </a:fld>
             <a:endParaRPr lang="en-US"/>
           </a:p>
@@ -1009,7 +1009,7 @@
           <a:p>
             <a:fld id="{2BCCED57-25DD-474A-969A-916086AE8F09}" type="datetimeFigureOut">
               <a:rPr lang="en-US" smtClean="0"/>
-              <a:t>3/25/2019</a:t>
+              <a:t>12/16/2019</a:t>
             </a:fld>
             <a:endParaRPr lang="en-US"/>
           </a:p>
@@ -1241,7 +1241,7 @@
           <a:p>
             <a:fld id="{2BCCED57-25DD-474A-969A-916086AE8F09}" type="datetimeFigureOut">
               <a:rPr lang="en-US" smtClean="0"/>
-              <a:t>3/25/2019</a:t>
+              <a:t>12/16/2019</a:t>
             </a:fld>
             <a:endParaRPr lang="en-US"/>
           </a:p>
@@ -1608,7 +1608,7 @@
           <a:p>
             <a:fld id="{2BCCED57-25DD-474A-969A-916086AE8F09}" type="datetimeFigureOut">
               <a:rPr lang="en-US" smtClean="0"/>
-              <a:t>3/25/2019</a:t>
+              <a:t>12/16/2019</a:t>
             </a:fld>
             <a:endParaRPr lang="en-US"/>
           </a:p>
@@ -1726,7 +1726,7 @@
           <a:p>
             <a:fld id="{2BCCED57-25DD-474A-969A-916086AE8F09}" type="datetimeFigureOut">
               <a:rPr lang="en-US" smtClean="0"/>
-              <a:t>3/25/2019</a:t>
+              <a:t>12/16/2019</a:t>
             </a:fld>
             <a:endParaRPr lang="en-US"/>
           </a:p>
@@ -1821,7 +1821,7 @@
           <a:p>
             <a:fld id="{2BCCED57-25DD-474A-969A-916086AE8F09}" type="datetimeFigureOut">
               <a:rPr lang="en-US" smtClean="0"/>
-              <a:t>3/25/2019</a:t>
+              <a:t>12/16/2019</a:t>
             </a:fld>
             <a:endParaRPr lang="en-US"/>
           </a:p>
@@ -2098,7 +2098,7 @@
           <a:p>
             <a:fld id="{2BCCED57-25DD-474A-969A-916086AE8F09}" type="datetimeFigureOut">
               <a:rPr lang="en-US" smtClean="0"/>
-              <a:t>3/25/2019</a:t>
+              <a:t>12/16/2019</a:t>
             </a:fld>
             <a:endParaRPr lang="en-US"/>
           </a:p>
@@ -2355,7 +2355,7 @@
           <a:p>
             <a:fld id="{2BCCED57-25DD-474A-969A-916086AE8F09}" type="datetimeFigureOut">
               <a:rPr lang="en-US" smtClean="0"/>
-              <a:t>3/25/2019</a:t>
+              <a:t>12/16/2019</a:t>
             </a:fld>
             <a:endParaRPr lang="en-US"/>
           </a:p>
@@ -2568,7 +2568,7 @@
           <a:p>
             <a:fld id="{2BCCED57-25DD-474A-969A-916086AE8F09}" type="datetimeFigureOut">
               <a:rPr lang="en-US" smtClean="0"/>
-              <a:t>3/25/2019</a:t>
+              <a:t>12/16/2019</a:t>
             </a:fld>
             <a:endParaRPr lang="en-US"/>
           </a:p>
@@ -3989,9 +3989,7 @@
               <a:prstGeom prst="rect">
                 <a:avLst/>
               </a:prstGeom>
-              <a:solidFill>
-                <a:schemeClr val="bg1"/>
-              </a:solidFill>
+              <a:noFill/>
               <a:ln>
                 <a:solidFill>
                   <a:schemeClr val="tx1"/>

</xml_diff>